<commit_message>
Monster stuff by pointer
</commit_message>
<xml_diff>
--- a/6044_FramPat/D2D/W01/INFO_6044_Engine_F24_W01D02_STL_Containers_1.pptx
+++ b/6044_FramPat/D2D/W01/INFO_6044_Engine_F24_W01D02_STL_Containers_1.pptx
@@ -5,7 +5,7 @@
     <p:sldMasterId id="2147483892" r:id="rId1"/>
   </p:sldMasterIdLst>
   <p:notesMasterIdLst>
-    <p:notesMasterId r:id="rId9"/>
+    <p:notesMasterId r:id="rId10"/>
   </p:notesMasterIdLst>
   <p:sldIdLst>
     <p:sldId id="256" r:id="rId2"/>
@@ -15,6 +15,7 @@
     <p:sldId id="321" r:id="rId6"/>
     <p:sldId id="319" r:id="rId7"/>
     <p:sldId id="320" r:id="rId8"/>
+    <p:sldId id="322" r:id="rId9"/>
   </p:sldIdLst>
   <p:sldSz cx="9144000" cy="5143500" type="screen16x9"/>
   <p:notesSz cx="6858000" cy="9144000"/>
@@ -7854,12 +7855,12 @@
               <a:t> or </a:t>
             </a:r>
             <a:r>
-              <a:rPr lang="en-CA"/>
-              <a:t>size_type, </a:t>
+              <a:rPr lang="en-CA" dirty="0" err="1"/>
+              <a:t>size_type</a:t>
             </a:r>
             <a:r>
               <a:rPr lang="en-CA" dirty="0"/>
-              <a:t>which is an int</a:t>
+              <a:t>, which is an int</a:t>
             </a:r>
           </a:p>
           <a:p>
@@ -7882,6 +7883,134 @@
     <p:extLst>
       <p:ext uri="{BB962C8B-B14F-4D97-AF65-F5344CB8AC3E}">
         <p14:creationId xmlns:p14="http://schemas.microsoft.com/office/powerpoint/2010/main" val="1034059532"/>
+      </p:ext>
+    </p:extLst>
+  </p:cSld>
+  <p:clrMapOvr>
+    <a:masterClrMapping/>
+  </p:clrMapOvr>
+</p:sld>
+</file>
+
+<file path=ppt/slides/slide8.xml><?xml version="1.0" encoding="utf-8"?>
+<p:sld xmlns:a="http://schemas.openxmlformats.org/drawingml/2006/main" xmlns:r="http://schemas.openxmlformats.org/officeDocument/2006/relationships" xmlns:p="http://schemas.openxmlformats.org/presentationml/2006/main">
+  <p:cSld>
+    <p:spTree>
+      <p:nvGrpSpPr>
+        <p:cNvPr id="1" name=""/>
+        <p:cNvGrpSpPr/>
+        <p:nvPr/>
+      </p:nvGrpSpPr>
+      <p:grpSpPr>
+        <a:xfrm>
+          <a:off x="0" y="0"/>
+          <a:ext cx="0" cy="0"/>
+          <a:chOff x="0" y="0"/>
+          <a:chExt cx="0" cy="0"/>
+        </a:xfrm>
+      </p:grpSpPr>
+      <p:sp>
+        <p:nvSpPr>
+          <p:cNvPr id="2" name="Title 1">
+            <a:extLst>
+              <a:ext uri="{FF2B5EF4-FFF2-40B4-BE49-F238E27FC236}">
+                <a16:creationId xmlns:a16="http://schemas.microsoft.com/office/drawing/2014/main" id="{DAEA9C4D-6FEC-452A-1742-9DD459D93046}"/>
+              </a:ext>
+            </a:extLst>
+          </p:cNvPr>
+          <p:cNvSpPr>
+            <a:spLocks noGrp="1"/>
+          </p:cNvSpPr>
+          <p:nvPr>
+            <p:ph type="title"/>
+          </p:nvPr>
+        </p:nvSpPr>
+        <p:spPr/>
+        <p:txBody>
+          <a:bodyPr/>
+          <a:lstStyle/>
+          <a:p>
+            <a:r>
+              <a:rPr lang="en-CA" sz="2800" dirty="0"/>
+              <a:t>CRC: Class, Responsivity, Collaboration</a:t>
+            </a:r>
+          </a:p>
+        </p:txBody>
+      </p:sp>
+      <p:sp>
+        <p:nvSpPr>
+          <p:cNvPr id="3" name="Content Placeholder 2">
+            <a:extLst>
+              <a:ext uri="{FF2B5EF4-FFF2-40B4-BE49-F238E27FC236}">
+                <a16:creationId xmlns:a16="http://schemas.microsoft.com/office/drawing/2014/main" id="{1AAD802A-7BD9-7642-52F1-2F164A9648E6}"/>
+              </a:ext>
+            </a:extLst>
+          </p:cNvPr>
+          <p:cNvSpPr>
+            <a:spLocks noGrp="1"/>
+          </p:cNvSpPr>
+          <p:nvPr>
+            <p:ph idx="1"/>
+          </p:nvPr>
+        </p:nvSpPr>
+        <p:spPr/>
+        <p:txBody>
+          <a:bodyPr>
+            <a:normAutofit lnSpcReduction="10000"/>
+          </a:bodyPr>
+          <a:lstStyle/>
+          <a:p>
+            <a:r>
+              <a:rPr lang="en-CA" dirty="0"/>
+              <a:t>Class: The “thing” you are keeping track of</a:t>
+            </a:r>
+          </a:p>
+          <a:p>
+            <a:pPr lvl="1"/>
+            <a:r>
+              <a:rPr lang="en-CA" dirty="0"/>
+              <a:t>(Database rules are helpful here: table names)</a:t>
+            </a:r>
+          </a:p>
+          <a:p>
+            <a:r>
+              <a:rPr lang="en-CA" dirty="0"/>
+              <a:t>Responsibility:</a:t>
+            </a:r>
+          </a:p>
+          <a:p>
+            <a:pPr lvl="1"/>
+            <a:r>
+              <a:rPr lang="en-CA" dirty="0"/>
+              <a:t>Who creates it? Who destroys it? </a:t>
+            </a:r>
+          </a:p>
+          <a:p>
+            <a:r>
+              <a:rPr lang="en-CA" dirty="0"/>
+              <a:t>Collaboration:</a:t>
+            </a:r>
+          </a:p>
+          <a:p>
+            <a:pPr lvl="1"/>
+            <a:r>
+              <a:rPr lang="en-CA" dirty="0"/>
+              <a:t>Who “talks” to this class? Transfers it around? </a:t>
+            </a:r>
+            <a:br>
+              <a:rPr lang="en-CA" dirty="0"/>
+            </a:br>
+            <a:r>
+              <a:rPr lang="en-CA" dirty="0"/>
+              <a:t>Etc.?</a:t>
+            </a:r>
+          </a:p>
+        </p:txBody>
+      </p:sp>
+    </p:spTree>
+    <p:extLst>
+      <p:ext uri="{BB962C8B-B14F-4D97-AF65-F5344CB8AC3E}">
+        <p14:creationId xmlns:p14="http://schemas.microsoft.com/office/powerpoint/2010/main" val="2149950019"/>
       </p:ext>
     </p:extLst>
   </p:cSld>

</xml_diff>

<commit_message>
Week 4 of graphics added
</commit_message>
<xml_diff>
--- a/6044_FramPat/D2D/W01/INFO_6044_Engine_F24_W01D02_STL_Containers_1.pptx
+++ b/6044_FramPat/D2D/W01/INFO_6044_Engine_F24_W01D02_STL_Containers_1.pptx
@@ -5,7 +5,7 @@
     <p:sldMasterId id="2147483892" r:id="rId1"/>
   </p:sldMasterIdLst>
   <p:notesMasterIdLst>
-    <p:notesMasterId r:id="rId10"/>
+    <p:notesMasterId r:id="rId14"/>
   </p:notesMasterIdLst>
   <p:sldIdLst>
     <p:sldId id="256" r:id="rId2"/>
@@ -16,6 +16,10 @@
     <p:sldId id="319" r:id="rId7"/>
     <p:sldId id="320" r:id="rId8"/>
     <p:sldId id="322" r:id="rId9"/>
+    <p:sldId id="323" r:id="rId10"/>
+    <p:sldId id="325" r:id="rId11"/>
+    <p:sldId id="326" r:id="rId12"/>
+    <p:sldId id="327" r:id="rId13"/>
   </p:sldIdLst>
   <p:sldSz cx="9144000" cy="5143500" type="screen16x9"/>
   <p:notesSz cx="6858000" cy="9144000"/>
@@ -216,7 +220,7 @@
             <a:fld id="{3D3F9196-5FBD-45F8-86BD-A3D90AC79AC7}" type="datetimeFigureOut">
               <a:rPr lang="en-CA" smtClean="0"/>
               <a:pPr/>
-              <a:t>2024-09-18</a:t>
+              <a:t>2024-09-23</a:t>
             </a:fld>
             <a:endParaRPr lang="en-CA"/>
           </a:p>
@@ -517,7 +521,7 @@
             <a:fld id="{8F6BCBE8-30B0-4476-8762-9236B142003A}" type="datetimeFigureOut">
               <a:rPr lang="en-US" smtClean="0"/>
               <a:pPr/>
-              <a:t>9/18/2024</a:t>
+              <a:t>9/23/2024</a:t>
             </a:fld>
             <a:endParaRPr lang="en-US" sz="1100" dirty="0">
               <a:solidFill>
@@ -1214,7 +1218,7 @@
             <a:fld id="{8F6BCBE8-30B0-4476-8762-9236B142003A}" type="datetimeFigureOut">
               <a:rPr lang="en-US" smtClean="0"/>
               <a:pPr/>
-              <a:t>9/18/2024</a:t>
+              <a:t>9/23/2024</a:t>
             </a:fld>
             <a:endParaRPr lang="en-US" sz="1100" dirty="0">
               <a:solidFill>
@@ -1399,7 +1403,7 @@
             <a:fld id="{8F6BCBE8-30B0-4476-8762-9236B142003A}" type="datetimeFigureOut">
               <a:rPr lang="en-US" smtClean="0"/>
               <a:pPr/>
-              <a:t>9/18/2024</a:t>
+              <a:t>9/23/2024</a:t>
             </a:fld>
             <a:endParaRPr lang="en-US" sz="1100" dirty="0">
               <a:solidFill>
@@ -1574,7 +1578,7 @@
             <a:fld id="{8F6BCBE8-30B0-4476-8762-9236B142003A}" type="datetimeFigureOut">
               <a:rPr lang="en-US" smtClean="0"/>
               <a:pPr/>
-              <a:t>9/18/2024</a:t>
+              <a:t>9/23/2024</a:t>
             </a:fld>
             <a:endParaRPr lang="en-US" sz="1100" dirty="0">
               <a:solidFill>
@@ -3032,7 +3036,7 @@
             <a:fld id="{8F6BCBE8-30B0-4476-8762-9236B142003A}" type="datetimeFigureOut">
               <a:rPr lang="en-US" smtClean="0"/>
               <a:pPr/>
-              <a:t>9/18/2024</a:t>
+              <a:t>9/23/2024</a:t>
             </a:fld>
             <a:endParaRPr lang="en-US" sz="1100" dirty="0">
               <a:solidFill>
@@ -3621,7 +3625,7 @@
             <a:fld id="{8F6BCBE8-30B0-4476-8762-9236B142003A}" type="datetimeFigureOut">
               <a:rPr lang="en-US" smtClean="0"/>
               <a:pPr/>
-              <a:t>9/18/2024</a:t>
+              <a:t>9/23/2024</a:t>
             </a:fld>
             <a:endParaRPr lang="en-US" sz="1100" dirty="0">
               <a:solidFill>
@@ -4060,7 +4064,7 @@
             <a:fld id="{8F6BCBE8-30B0-4476-8762-9236B142003A}" type="datetimeFigureOut">
               <a:rPr lang="en-US" smtClean="0"/>
               <a:pPr/>
-              <a:t>9/18/2024</a:t>
+              <a:t>9/23/2024</a:t>
             </a:fld>
             <a:endParaRPr lang="en-US" sz="1100" dirty="0">
               <a:solidFill>
@@ -4607,7 +4611,7 @@
             <a:fld id="{8F6BCBE8-30B0-4476-8762-9236B142003A}" type="datetimeFigureOut">
               <a:rPr lang="en-US" smtClean="0"/>
               <a:pPr/>
-              <a:t>9/18/2024</a:t>
+              <a:t>9/23/2024</a:t>
             </a:fld>
             <a:endParaRPr lang="en-US" sz="1100" dirty="0">
               <a:solidFill>
@@ -4708,7 +4712,7 @@
             <a:fld id="{8F6BCBE8-30B0-4476-8762-9236B142003A}" type="datetimeFigureOut">
               <a:rPr lang="en-US" smtClean="0"/>
               <a:pPr/>
-              <a:t>9/18/2024</a:t>
+              <a:t>9/23/2024</a:t>
             </a:fld>
             <a:endParaRPr lang="en-US" sz="1100" dirty="0">
               <a:solidFill>
@@ -4966,7 +4970,7 @@
             <a:fld id="{8F6BCBE8-30B0-4476-8762-9236B142003A}" type="datetimeFigureOut">
               <a:rPr lang="en-US" smtClean="0"/>
               <a:pPr/>
-              <a:t>9/18/2024</a:t>
+              <a:t>9/23/2024</a:t>
             </a:fld>
             <a:endParaRPr lang="en-US" sz="1100" dirty="0">
               <a:solidFill>
@@ -5688,7 +5692,7 @@
             <a:fld id="{8F6BCBE8-30B0-4476-8762-9236B142003A}" type="datetimeFigureOut">
               <a:rPr lang="en-US" smtClean="0"/>
               <a:pPr/>
-              <a:t>9/18/2024</a:t>
+              <a:t>9/23/2024</a:t>
             </a:fld>
             <a:endParaRPr lang="en-US" sz="1100" dirty="0">
               <a:solidFill>
@@ -6344,7 +6348,7 @@
             <a:fld id="{8F6BCBE8-30B0-4476-8762-9236B142003A}" type="datetimeFigureOut">
               <a:rPr lang="en-US" smtClean="0"/>
               <a:pPr/>
-              <a:t>9/18/2024</a:t>
+              <a:t>9/23/2024</a:t>
             </a:fld>
             <a:endParaRPr lang="en-US" sz="1100" dirty="0">
               <a:solidFill>
@@ -6953,6 +6957,537 @@
 </p:sld>
 </file>
 
+<file path=ppt/slides/slide10.xml><?xml version="1.0" encoding="utf-8"?>
+<p:sld xmlns:a="http://schemas.openxmlformats.org/drawingml/2006/main" xmlns:r="http://schemas.openxmlformats.org/officeDocument/2006/relationships" xmlns:p="http://schemas.openxmlformats.org/presentationml/2006/main">
+  <p:cSld>
+    <p:spTree>
+      <p:nvGrpSpPr>
+        <p:cNvPr id="1" name=""/>
+        <p:cNvGrpSpPr/>
+        <p:nvPr/>
+      </p:nvGrpSpPr>
+      <p:grpSpPr>
+        <a:xfrm>
+          <a:off x="0" y="0"/>
+          <a:ext cx="0" cy="0"/>
+          <a:chOff x="0" y="0"/>
+          <a:chExt cx="0" cy="0"/>
+        </a:xfrm>
+      </p:grpSpPr>
+      <p:sp>
+        <p:nvSpPr>
+          <p:cNvPr id="2" name="Title 1">
+            <a:extLst>
+              <a:ext uri="{FF2B5EF4-FFF2-40B4-BE49-F238E27FC236}">
+                <a16:creationId xmlns:a16="http://schemas.microsoft.com/office/drawing/2014/main" id="{FE7D8B2D-E20C-8F97-D548-25A7395550F4}"/>
+              </a:ext>
+            </a:extLst>
+          </p:cNvPr>
+          <p:cNvSpPr>
+            <a:spLocks noGrp="1"/>
+          </p:cNvSpPr>
+          <p:nvPr>
+            <p:ph type="title"/>
+          </p:nvPr>
+        </p:nvSpPr>
+        <p:spPr/>
+        <p:txBody>
+          <a:bodyPr/>
+          <a:lstStyle/>
+          <a:p>
+            <a:r>
+              <a:rPr lang="en-CA" sz="3600" dirty="0"/>
+              <a:t>std::map (aka “</a:t>
+            </a:r>
+            <a:r>
+              <a:rPr lang="en-CA" sz="3600" dirty="0" err="1"/>
+              <a:t>dictonary</a:t>
+            </a:r>
+            <a:r>
+              <a:rPr lang="en-CA" sz="3600" dirty="0"/>
+              <a:t>”)</a:t>
+            </a:r>
+          </a:p>
+        </p:txBody>
+      </p:sp>
+      <p:sp>
+        <p:nvSpPr>
+          <p:cNvPr id="3" name="Content Placeholder 2">
+            <a:extLst>
+              <a:ext uri="{FF2B5EF4-FFF2-40B4-BE49-F238E27FC236}">
+                <a16:creationId xmlns:a16="http://schemas.microsoft.com/office/drawing/2014/main" id="{AB4134F9-4B81-F7AF-A39D-DC340F89C489}"/>
+              </a:ext>
+            </a:extLst>
+          </p:cNvPr>
+          <p:cNvSpPr>
+            <a:spLocks noGrp="1"/>
+          </p:cNvSpPr>
+          <p:nvPr>
+            <p:ph idx="1"/>
+          </p:nvPr>
+        </p:nvSpPr>
+        <p:spPr/>
+        <p:txBody>
+          <a:bodyPr>
+            <a:normAutofit/>
+          </a:bodyPr>
+          <a:lstStyle/>
+          <a:p>
+            <a:r>
+              <a:rPr lang="en-CA" dirty="0"/>
+              <a:t>Sort of looks like an array, but we can index it with any type we want</a:t>
+            </a:r>
+          </a:p>
+          <a:p>
+            <a:r>
+              <a:rPr lang="en-CA" dirty="0">
+                <a:latin typeface="Courier New" panose="02070309020205020404" pitchFamily="49" charset="0"/>
+                <a:cs typeface="Courier New" panose="02070309020205020404" pitchFamily="49" charset="0"/>
+              </a:rPr>
+              <a:t>int </a:t>
+            </a:r>
+            <a:r>
+              <a:rPr lang="en-CA" dirty="0" err="1">
+                <a:latin typeface="Courier New" panose="02070309020205020404" pitchFamily="49" charset="0"/>
+                <a:cs typeface="Courier New" panose="02070309020205020404" pitchFamily="49" charset="0"/>
+              </a:rPr>
+              <a:t>myarray</a:t>
+            </a:r>
+            <a:r>
+              <a:rPr lang="en-CA" dirty="0">
+                <a:latin typeface="Courier New" panose="02070309020205020404" pitchFamily="49" charset="0"/>
+                <a:cs typeface="Courier New" panose="02070309020205020404" pitchFamily="49" charset="0"/>
+              </a:rPr>
+              <a:t>[100];</a:t>
+            </a:r>
+          </a:p>
+          <a:p>
+            <a:pPr marL="667512" lvl="2" indent="-342900">
+              <a:spcBef>
+                <a:spcPts val="700"/>
+              </a:spcBef>
+              <a:buClr>
+                <a:schemeClr val="tx2"/>
+              </a:buClr>
+              <a:buSzPct val="95000"/>
+              <a:buFont typeface="Wingdings"/>
+              <a:buChar char=""/>
+            </a:pPr>
+            <a:r>
+              <a:rPr lang="en-CA" sz="2800" dirty="0"/>
+              <a:t>Indexed by a int</a:t>
+            </a:r>
+          </a:p>
+          <a:p>
+            <a:pPr marL="667512" lvl="2" indent="-342900">
+              <a:spcBef>
+                <a:spcPts val="700"/>
+              </a:spcBef>
+              <a:buClr>
+                <a:schemeClr val="tx2"/>
+              </a:buClr>
+              <a:buSzPct val="95000"/>
+              <a:buFont typeface="Wingdings"/>
+              <a:buChar char=""/>
+            </a:pPr>
+            <a:r>
+              <a:rPr lang="en-CA" sz="2800" dirty="0"/>
+              <a:t>Stores </a:t>
+            </a:r>
+            <a:r>
+              <a:rPr lang="en-CA" sz="2800" dirty="0" err="1"/>
+              <a:t>ints</a:t>
+            </a:r>
+            <a:endParaRPr lang="en-CA" sz="2800" dirty="0"/>
+          </a:p>
+        </p:txBody>
+      </p:sp>
+    </p:spTree>
+    <p:extLst>
+      <p:ext uri="{BB962C8B-B14F-4D97-AF65-F5344CB8AC3E}">
+        <p14:creationId xmlns:p14="http://schemas.microsoft.com/office/powerpoint/2010/main" val="2573694475"/>
+      </p:ext>
+    </p:extLst>
+  </p:cSld>
+  <p:clrMapOvr>
+    <a:masterClrMapping/>
+  </p:clrMapOvr>
+</p:sld>
+</file>
+
+<file path=ppt/slides/slide11.xml><?xml version="1.0" encoding="utf-8"?>
+<p:sld xmlns:a="http://schemas.openxmlformats.org/drawingml/2006/main" xmlns:r="http://schemas.openxmlformats.org/officeDocument/2006/relationships" xmlns:p="http://schemas.openxmlformats.org/presentationml/2006/main">
+  <p:cSld>
+    <p:spTree>
+      <p:nvGrpSpPr>
+        <p:cNvPr id="1" name=""/>
+        <p:cNvGrpSpPr/>
+        <p:nvPr/>
+      </p:nvGrpSpPr>
+      <p:grpSpPr>
+        <a:xfrm>
+          <a:off x="0" y="0"/>
+          <a:ext cx="0" cy="0"/>
+          <a:chOff x="0" y="0"/>
+          <a:chExt cx="0" cy="0"/>
+        </a:xfrm>
+      </p:grpSpPr>
+      <p:sp>
+        <p:nvSpPr>
+          <p:cNvPr id="2" name="Title 1">
+            <a:extLst>
+              <a:ext uri="{FF2B5EF4-FFF2-40B4-BE49-F238E27FC236}">
+                <a16:creationId xmlns:a16="http://schemas.microsoft.com/office/drawing/2014/main" id="{FE7D8B2D-E20C-8F97-D548-25A7395550F4}"/>
+              </a:ext>
+            </a:extLst>
+          </p:cNvPr>
+          <p:cNvSpPr>
+            <a:spLocks noGrp="1"/>
+          </p:cNvSpPr>
+          <p:nvPr>
+            <p:ph type="title"/>
+          </p:nvPr>
+        </p:nvSpPr>
+        <p:spPr/>
+        <p:txBody>
+          <a:bodyPr/>
+          <a:lstStyle/>
+          <a:p>
+            <a:r>
+              <a:rPr lang="en-CA" sz="3600" dirty="0"/>
+              <a:t>std::map (aka “</a:t>
+            </a:r>
+            <a:r>
+              <a:rPr lang="en-CA" sz="3600" dirty="0" err="1"/>
+              <a:t>dictonary</a:t>
+            </a:r>
+            <a:r>
+              <a:rPr lang="en-CA" sz="3600" dirty="0"/>
+              <a:t>”)</a:t>
+            </a:r>
+          </a:p>
+        </p:txBody>
+      </p:sp>
+      <p:sp>
+        <p:nvSpPr>
+          <p:cNvPr id="3" name="Content Placeholder 2">
+            <a:extLst>
+              <a:ext uri="{FF2B5EF4-FFF2-40B4-BE49-F238E27FC236}">
+                <a16:creationId xmlns:a16="http://schemas.microsoft.com/office/drawing/2014/main" id="{AB4134F9-4B81-F7AF-A39D-DC340F89C489}"/>
+              </a:ext>
+            </a:extLst>
+          </p:cNvPr>
+          <p:cNvSpPr>
+            <a:spLocks noGrp="1"/>
+          </p:cNvSpPr>
+          <p:nvPr>
+            <p:ph idx="1"/>
+          </p:nvPr>
+        </p:nvSpPr>
+        <p:spPr/>
+        <p:txBody>
+          <a:bodyPr>
+            <a:normAutofit lnSpcReduction="10000"/>
+          </a:bodyPr>
+          <a:lstStyle/>
+          <a:p>
+            <a:r>
+              <a:rPr lang="en-CA" dirty="0"/>
+              <a:t>Sort of looks like an array, but we can index it with any type we want</a:t>
+            </a:r>
+          </a:p>
+          <a:p>
+            <a:r>
+              <a:rPr lang="en-CA" dirty="0">
+                <a:latin typeface="Courier New" panose="02070309020205020404" pitchFamily="49" charset="0"/>
+                <a:cs typeface="Courier New" panose="02070309020205020404" pitchFamily="49" charset="0"/>
+              </a:rPr>
+              <a:t>std::string </a:t>
+            </a:r>
+            <a:r>
+              <a:rPr lang="en-CA" dirty="0" err="1">
+                <a:latin typeface="Courier New" panose="02070309020205020404" pitchFamily="49" charset="0"/>
+                <a:cs typeface="Courier New" panose="02070309020205020404" pitchFamily="49" charset="0"/>
+              </a:rPr>
+              <a:t>myarray</a:t>
+            </a:r>
+            <a:r>
+              <a:rPr lang="en-CA" dirty="0">
+                <a:latin typeface="Courier New" panose="02070309020205020404" pitchFamily="49" charset="0"/>
+                <a:cs typeface="Courier New" panose="02070309020205020404" pitchFamily="49" charset="0"/>
+              </a:rPr>
+              <a:t>[100];</a:t>
+            </a:r>
+          </a:p>
+          <a:p>
+            <a:pPr marL="667512" lvl="2" indent="-342900">
+              <a:spcBef>
+                <a:spcPts val="700"/>
+              </a:spcBef>
+              <a:buClr>
+                <a:schemeClr val="tx2"/>
+              </a:buClr>
+              <a:buSzPct val="95000"/>
+              <a:buFont typeface="Wingdings"/>
+              <a:buChar char=""/>
+            </a:pPr>
+            <a:r>
+              <a:rPr lang="en-CA" sz="2800" dirty="0"/>
+              <a:t>Indexed by a int</a:t>
+            </a:r>
+          </a:p>
+          <a:p>
+            <a:pPr marL="667512" lvl="2" indent="-342900">
+              <a:spcBef>
+                <a:spcPts val="700"/>
+              </a:spcBef>
+              <a:buClr>
+                <a:schemeClr val="tx2"/>
+              </a:buClr>
+              <a:buSzPct val="95000"/>
+              <a:buFont typeface="Wingdings"/>
+              <a:buChar char=""/>
+            </a:pPr>
+            <a:r>
+              <a:rPr lang="en-CA" sz="2800" dirty="0"/>
+              <a:t>(starts at 0 and goes to whatever)</a:t>
+            </a:r>
+          </a:p>
+          <a:p>
+            <a:pPr marL="667512" lvl="2" indent="-342900">
+              <a:spcBef>
+                <a:spcPts val="700"/>
+              </a:spcBef>
+              <a:buClr>
+                <a:schemeClr val="tx2"/>
+              </a:buClr>
+              <a:buSzPct val="95000"/>
+              <a:buFont typeface="Wingdings"/>
+              <a:buChar char=""/>
+            </a:pPr>
+            <a:r>
+              <a:rPr lang="en-CA" sz="2800" dirty="0"/>
+              <a:t>Stores strings</a:t>
+            </a:r>
+          </a:p>
+          <a:p>
+            <a:pPr marL="667512" lvl="2" indent="-342900">
+              <a:spcBef>
+                <a:spcPts val="700"/>
+              </a:spcBef>
+              <a:buClr>
+                <a:schemeClr val="tx2"/>
+              </a:buClr>
+              <a:buSzPct val="95000"/>
+              <a:buFont typeface="Wingdings"/>
+              <a:buChar char=""/>
+            </a:pPr>
+            <a:r>
+              <a:rPr lang="en-CA" sz="2800" dirty="0"/>
+              <a:t>Stored in order, contiguously</a:t>
+            </a:r>
+          </a:p>
+        </p:txBody>
+      </p:sp>
+    </p:spTree>
+    <p:extLst>
+      <p:ext uri="{BB962C8B-B14F-4D97-AF65-F5344CB8AC3E}">
+        <p14:creationId xmlns:p14="http://schemas.microsoft.com/office/powerpoint/2010/main" val="69483661"/>
+      </p:ext>
+    </p:extLst>
+  </p:cSld>
+  <p:clrMapOvr>
+    <a:masterClrMapping/>
+  </p:clrMapOvr>
+</p:sld>
+</file>
+
+<file path=ppt/slides/slide12.xml><?xml version="1.0" encoding="utf-8"?>
+<p:sld xmlns:a="http://schemas.openxmlformats.org/drawingml/2006/main" xmlns:r="http://schemas.openxmlformats.org/officeDocument/2006/relationships" xmlns:p="http://schemas.openxmlformats.org/presentationml/2006/main">
+  <p:cSld>
+    <p:spTree>
+      <p:nvGrpSpPr>
+        <p:cNvPr id="1" name=""/>
+        <p:cNvGrpSpPr/>
+        <p:nvPr/>
+      </p:nvGrpSpPr>
+      <p:grpSpPr>
+        <a:xfrm>
+          <a:off x="0" y="0"/>
+          <a:ext cx="0" cy="0"/>
+          <a:chOff x="0" y="0"/>
+          <a:chExt cx="0" cy="0"/>
+        </a:xfrm>
+      </p:grpSpPr>
+      <p:sp>
+        <p:nvSpPr>
+          <p:cNvPr id="2" name="Title 1">
+            <a:extLst>
+              <a:ext uri="{FF2B5EF4-FFF2-40B4-BE49-F238E27FC236}">
+                <a16:creationId xmlns:a16="http://schemas.microsoft.com/office/drawing/2014/main" id="{FE7D8B2D-E20C-8F97-D548-25A7395550F4}"/>
+              </a:ext>
+            </a:extLst>
+          </p:cNvPr>
+          <p:cNvSpPr>
+            <a:spLocks noGrp="1"/>
+          </p:cNvSpPr>
+          <p:nvPr>
+            <p:ph type="title"/>
+          </p:nvPr>
+        </p:nvSpPr>
+        <p:spPr/>
+        <p:txBody>
+          <a:bodyPr/>
+          <a:lstStyle/>
+          <a:p>
+            <a:r>
+              <a:rPr lang="en-CA" sz="3600" dirty="0"/>
+              <a:t>std::map (aka “dictionary”)</a:t>
+            </a:r>
+          </a:p>
+        </p:txBody>
+      </p:sp>
+      <p:sp>
+        <p:nvSpPr>
+          <p:cNvPr id="3" name="Content Placeholder 2">
+            <a:extLst>
+              <a:ext uri="{FF2B5EF4-FFF2-40B4-BE49-F238E27FC236}">
+                <a16:creationId xmlns:a16="http://schemas.microsoft.com/office/drawing/2014/main" id="{AB4134F9-4B81-F7AF-A39D-DC340F89C489}"/>
+              </a:ext>
+            </a:extLst>
+          </p:cNvPr>
+          <p:cNvSpPr>
+            <a:spLocks noGrp="1"/>
+          </p:cNvSpPr>
+          <p:nvPr>
+            <p:ph idx="1"/>
+          </p:nvPr>
+        </p:nvSpPr>
+        <p:spPr/>
+        <p:txBody>
+          <a:bodyPr>
+            <a:normAutofit lnSpcReduction="10000"/>
+          </a:bodyPr>
+          <a:lstStyle/>
+          <a:p>
+            <a:r>
+              <a:rPr lang="en-CA" dirty="0"/>
+              <a:t>Sort of looks like an array, but we can index it with any type we want</a:t>
+            </a:r>
+          </a:p>
+          <a:p>
+            <a:r>
+              <a:rPr lang="en-CA" dirty="0" err="1">
+                <a:latin typeface="Courier New" panose="02070309020205020404" pitchFamily="49" charset="0"/>
+                <a:cs typeface="Courier New" panose="02070309020205020404" pitchFamily="49" charset="0"/>
+              </a:rPr>
+              <a:t>cMonster</a:t>
+            </a:r>
+            <a:r>
+              <a:rPr lang="en-CA" dirty="0">
+                <a:latin typeface="Courier New" panose="02070309020205020404" pitchFamily="49" charset="0"/>
+                <a:cs typeface="Courier New" panose="02070309020205020404" pitchFamily="49" charset="0"/>
+              </a:rPr>
+              <a:t> </a:t>
+            </a:r>
+            <a:r>
+              <a:rPr lang="en-CA" dirty="0" err="1">
+                <a:latin typeface="Courier New" panose="02070309020205020404" pitchFamily="49" charset="0"/>
+                <a:cs typeface="Courier New" panose="02070309020205020404" pitchFamily="49" charset="0"/>
+              </a:rPr>
+              <a:t>myarray</a:t>
+            </a:r>
+            <a:r>
+              <a:rPr lang="en-CA" dirty="0">
+                <a:latin typeface="Courier New" panose="02070309020205020404" pitchFamily="49" charset="0"/>
+                <a:cs typeface="Courier New" panose="02070309020205020404" pitchFamily="49" charset="0"/>
+              </a:rPr>
+              <a:t>[100];</a:t>
+            </a:r>
+          </a:p>
+          <a:p>
+            <a:pPr marL="667512" lvl="2" indent="-342900">
+              <a:spcBef>
+                <a:spcPts val="700"/>
+              </a:spcBef>
+              <a:buClr>
+                <a:schemeClr val="tx2"/>
+              </a:buClr>
+              <a:buSzPct val="95000"/>
+              <a:buFont typeface="Wingdings"/>
+              <a:buChar char=""/>
+            </a:pPr>
+            <a:r>
+              <a:rPr lang="en-CA" sz="2800" dirty="0"/>
+              <a:t>Indexed by a int</a:t>
+            </a:r>
+          </a:p>
+          <a:p>
+            <a:pPr marL="667512" lvl="2" indent="-342900">
+              <a:spcBef>
+                <a:spcPts val="700"/>
+              </a:spcBef>
+              <a:buClr>
+                <a:schemeClr val="tx2"/>
+              </a:buClr>
+              <a:buSzPct val="95000"/>
+              <a:buFont typeface="Wingdings"/>
+              <a:buChar char=""/>
+            </a:pPr>
+            <a:r>
+              <a:rPr lang="en-CA" sz="2800" dirty="0"/>
+              <a:t>(starts at 0 and goes to whatever)</a:t>
+            </a:r>
+          </a:p>
+          <a:p>
+            <a:pPr marL="667512" lvl="2" indent="-342900">
+              <a:spcBef>
+                <a:spcPts val="700"/>
+              </a:spcBef>
+              <a:buClr>
+                <a:schemeClr val="tx2"/>
+              </a:buClr>
+              <a:buSzPct val="95000"/>
+              <a:buFont typeface="Wingdings"/>
+              <a:buChar char=""/>
+            </a:pPr>
+            <a:r>
+              <a:rPr lang="en-CA" sz="2800" dirty="0"/>
+              <a:t>Stores monster</a:t>
+            </a:r>
+          </a:p>
+          <a:p>
+            <a:pPr marL="667512" lvl="2" indent="-342900">
+              <a:spcBef>
+                <a:spcPts val="700"/>
+              </a:spcBef>
+              <a:buClr>
+                <a:schemeClr val="tx2"/>
+              </a:buClr>
+              <a:buSzPct val="95000"/>
+              <a:buFont typeface="Wingdings"/>
+              <a:buChar char=""/>
+            </a:pPr>
+            <a:r>
+              <a:rPr lang="en-CA" sz="2800" dirty="0"/>
+              <a:t>Stored in order, contiguously</a:t>
+            </a:r>
+          </a:p>
+        </p:txBody>
+      </p:sp>
+    </p:spTree>
+    <p:extLst>
+      <p:ext uri="{BB962C8B-B14F-4D97-AF65-F5344CB8AC3E}">
+        <p14:creationId xmlns:p14="http://schemas.microsoft.com/office/powerpoint/2010/main" val="1619975794"/>
+      </p:ext>
+    </p:extLst>
+  </p:cSld>
+  <p:clrMapOvr>
+    <a:masterClrMapping/>
+  </p:clrMapOvr>
+</p:sld>
+</file>
+
 <file path=ppt/slides/slide2.xml><?xml version="1.0" encoding="utf-8"?>
 <p:sld xmlns:a="http://schemas.openxmlformats.org/drawingml/2006/main" xmlns:r="http://schemas.openxmlformats.org/officeDocument/2006/relationships" xmlns:p="http://schemas.openxmlformats.org/presentationml/2006/main">
   <p:cSld>
@@ -7956,7 +8491,7 @@
         <p:spPr/>
         <p:txBody>
           <a:bodyPr>
-            <a:normAutofit lnSpcReduction="10000"/>
+            <a:normAutofit/>
           </a:bodyPr>
           <a:lstStyle/>
           <a:p>
@@ -7992,7 +8527,7 @@
             </a:r>
           </a:p>
           <a:p>
-            <a:pPr lvl="1"/>
+            <a:pPr lvl="2"/>
             <a:r>
               <a:rPr lang="en-CA" dirty="0"/>
               <a:t>Who “talks” to this class? Transfers it around? </a:t>
@@ -8011,6 +8546,440 @@
     <p:extLst>
       <p:ext uri="{BB962C8B-B14F-4D97-AF65-F5344CB8AC3E}">
         <p14:creationId xmlns:p14="http://schemas.microsoft.com/office/powerpoint/2010/main" val="2149950019"/>
+      </p:ext>
+    </p:extLst>
+  </p:cSld>
+  <p:clrMapOvr>
+    <a:masterClrMapping/>
+  </p:clrMapOvr>
+</p:sld>
+</file>
+
+<file path=ppt/slides/slide9.xml><?xml version="1.0" encoding="utf-8"?>
+<p:sld xmlns:a="http://schemas.openxmlformats.org/drawingml/2006/main" xmlns:r="http://schemas.openxmlformats.org/officeDocument/2006/relationships" xmlns:p="http://schemas.openxmlformats.org/presentationml/2006/main">
+  <p:cSld>
+    <p:spTree>
+      <p:nvGrpSpPr>
+        <p:cNvPr id="1" name=""/>
+        <p:cNvGrpSpPr/>
+        <p:nvPr/>
+      </p:nvGrpSpPr>
+      <p:grpSpPr>
+        <a:xfrm>
+          <a:off x="0" y="0"/>
+          <a:ext cx="0" cy="0"/>
+          <a:chOff x="0" y="0"/>
+          <a:chExt cx="0" cy="0"/>
+        </a:xfrm>
+      </p:grpSpPr>
+      <p:sp>
+        <p:nvSpPr>
+          <p:cNvPr id="4" name="Rectangle: Rounded Corners 3">
+            <a:extLst>
+              <a:ext uri="{FF2B5EF4-FFF2-40B4-BE49-F238E27FC236}">
+                <a16:creationId xmlns:a16="http://schemas.microsoft.com/office/drawing/2014/main" id="{A69EC230-CD16-E406-A990-0BA539EA10FE}"/>
+              </a:ext>
+            </a:extLst>
+          </p:cNvPr>
+          <p:cNvSpPr/>
+          <p:nvPr/>
+        </p:nvSpPr>
+        <p:spPr>
+          <a:xfrm>
+            <a:off x="7162800" y="2551528"/>
+            <a:ext cx="1752600" cy="914400"/>
+          </a:xfrm>
+          <a:prstGeom prst="roundRect">
+            <a:avLst/>
+          </a:prstGeom>
+        </p:spPr>
+        <p:style>
+          <a:lnRef idx="2">
+            <a:schemeClr val="accent1">
+              <a:shade val="15000"/>
+            </a:schemeClr>
+          </a:lnRef>
+          <a:fillRef idx="1">
+            <a:schemeClr val="accent1"/>
+          </a:fillRef>
+          <a:effectRef idx="0">
+            <a:schemeClr val="accent1"/>
+          </a:effectRef>
+          <a:fontRef idx="minor">
+            <a:schemeClr val="lt1"/>
+          </a:fontRef>
+        </p:style>
+        <p:txBody>
+          <a:bodyPr rtlCol="0" anchor="ctr"/>
+          <a:lstStyle/>
+          <a:p>
+            <a:pPr algn="ctr"/>
+            <a:r>
+              <a:rPr lang="en-CA" dirty="0" err="1">
+                <a:solidFill>
+                  <a:schemeClr val="bg1"/>
+                </a:solidFill>
+              </a:rPr>
+              <a:t>cMonster</a:t>
+            </a:r>
+            <a:endParaRPr lang="en-CA" dirty="0">
+              <a:solidFill>
+                <a:schemeClr val="bg1"/>
+              </a:solidFill>
+            </a:endParaRPr>
+          </a:p>
+        </p:txBody>
+      </p:sp>
+      <p:sp>
+        <p:nvSpPr>
+          <p:cNvPr id="5" name="Rectangle: Rounded Corners 4">
+            <a:extLst>
+              <a:ext uri="{FF2B5EF4-FFF2-40B4-BE49-F238E27FC236}">
+                <a16:creationId xmlns:a16="http://schemas.microsoft.com/office/drawing/2014/main" id="{4B3588BB-5CFA-AACD-FFAF-BF4DEEA702F9}"/>
+              </a:ext>
+            </a:extLst>
+          </p:cNvPr>
+          <p:cNvSpPr/>
+          <p:nvPr/>
+        </p:nvSpPr>
+        <p:spPr>
+          <a:xfrm>
+            <a:off x="4800600" y="1047750"/>
+            <a:ext cx="2209800" cy="914400"/>
+          </a:xfrm>
+          <a:prstGeom prst="roundRect">
+            <a:avLst/>
+          </a:prstGeom>
+        </p:spPr>
+        <p:style>
+          <a:lnRef idx="2">
+            <a:schemeClr val="accent1">
+              <a:shade val="15000"/>
+            </a:schemeClr>
+          </a:lnRef>
+          <a:fillRef idx="1">
+            <a:schemeClr val="accent1"/>
+          </a:fillRef>
+          <a:effectRef idx="0">
+            <a:schemeClr val="accent1"/>
+          </a:effectRef>
+          <a:fontRef idx="minor">
+            <a:schemeClr val="lt1"/>
+          </a:fontRef>
+        </p:style>
+        <p:txBody>
+          <a:bodyPr rtlCol="0" anchor="ctr"/>
+          <a:lstStyle/>
+          <a:p>
+            <a:pPr algn="ctr"/>
+            <a:r>
+              <a:rPr lang="en-CA" dirty="0" err="1">
+                <a:solidFill>
+                  <a:schemeClr val="bg1"/>
+                </a:solidFill>
+              </a:rPr>
+              <a:t>cMonsterCreator</a:t>
+            </a:r>
+            <a:endParaRPr lang="en-CA" dirty="0">
+              <a:solidFill>
+                <a:schemeClr val="bg1"/>
+              </a:solidFill>
+            </a:endParaRPr>
+          </a:p>
+        </p:txBody>
+      </p:sp>
+      <p:sp>
+        <p:nvSpPr>
+          <p:cNvPr id="6" name="Rectangle: Rounded Corners 5">
+            <a:extLst>
+              <a:ext uri="{FF2B5EF4-FFF2-40B4-BE49-F238E27FC236}">
+                <a16:creationId xmlns:a16="http://schemas.microsoft.com/office/drawing/2014/main" id="{8070FB6E-7A2F-F9FC-18E7-08E9C0FBC15D}"/>
+              </a:ext>
+            </a:extLst>
+          </p:cNvPr>
+          <p:cNvSpPr/>
+          <p:nvPr/>
+        </p:nvSpPr>
+        <p:spPr>
+          <a:xfrm>
+            <a:off x="1905000" y="2551528"/>
+            <a:ext cx="2209800" cy="914400"/>
+          </a:xfrm>
+          <a:prstGeom prst="roundRect">
+            <a:avLst/>
+          </a:prstGeom>
+        </p:spPr>
+        <p:style>
+          <a:lnRef idx="2">
+            <a:schemeClr val="accent1">
+              <a:shade val="15000"/>
+            </a:schemeClr>
+          </a:lnRef>
+          <a:fillRef idx="1">
+            <a:schemeClr val="accent1"/>
+          </a:fillRef>
+          <a:effectRef idx="0">
+            <a:schemeClr val="accent1"/>
+          </a:effectRef>
+          <a:fontRef idx="minor">
+            <a:schemeClr val="lt1"/>
+          </a:fontRef>
+        </p:style>
+        <p:txBody>
+          <a:bodyPr rtlCol="0" anchor="ctr"/>
+          <a:lstStyle/>
+          <a:p>
+            <a:pPr algn="ctr"/>
+            <a:r>
+              <a:rPr lang="en-CA" dirty="0" err="1">
+                <a:solidFill>
+                  <a:schemeClr val="bg1"/>
+                </a:solidFill>
+              </a:rPr>
+              <a:t>cArena</a:t>
+            </a:r>
+            <a:endParaRPr lang="en-CA" dirty="0">
+              <a:solidFill>
+                <a:schemeClr val="bg1"/>
+              </a:solidFill>
+            </a:endParaRPr>
+          </a:p>
+        </p:txBody>
+      </p:sp>
+      <p:sp>
+        <p:nvSpPr>
+          <p:cNvPr id="7" name="Rectangle 6">
+            <a:extLst>
+              <a:ext uri="{FF2B5EF4-FFF2-40B4-BE49-F238E27FC236}">
+                <a16:creationId xmlns:a16="http://schemas.microsoft.com/office/drawing/2014/main" id="{197DDAC7-310F-087C-5780-54CD48774833}"/>
+              </a:ext>
+            </a:extLst>
+          </p:cNvPr>
+          <p:cNvSpPr/>
+          <p:nvPr/>
+        </p:nvSpPr>
+        <p:spPr>
+          <a:xfrm>
+            <a:off x="533400" y="819150"/>
+            <a:ext cx="1143000" cy="609600"/>
+          </a:xfrm>
+          <a:prstGeom prst="rect">
+            <a:avLst/>
+          </a:prstGeom>
+        </p:spPr>
+        <p:style>
+          <a:lnRef idx="2">
+            <a:schemeClr val="accent3">
+              <a:shade val="15000"/>
+            </a:schemeClr>
+          </a:lnRef>
+          <a:fillRef idx="1">
+            <a:schemeClr val="accent3"/>
+          </a:fillRef>
+          <a:effectRef idx="0">
+            <a:schemeClr val="accent3"/>
+          </a:effectRef>
+          <a:fontRef idx="minor">
+            <a:schemeClr val="lt1"/>
+          </a:fontRef>
+        </p:style>
+        <p:txBody>
+          <a:bodyPr rtlCol="0" anchor="ctr"/>
+          <a:lstStyle/>
+          <a:p>
+            <a:pPr algn="ctr"/>
+            <a:r>
+              <a:rPr lang="en-CA" dirty="0" err="1">
+                <a:solidFill>
+                  <a:schemeClr val="bg1"/>
+                </a:solidFill>
+              </a:rPr>
+              <a:t>theMain</a:t>
+            </a:r>
+            <a:endParaRPr lang="en-CA" dirty="0">
+              <a:solidFill>
+                <a:schemeClr val="bg1"/>
+              </a:solidFill>
+            </a:endParaRPr>
+          </a:p>
+        </p:txBody>
+      </p:sp>
+      <p:cxnSp>
+        <p:nvCxnSpPr>
+          <p:cNvPr id="9" name="Straight Arrow Connector 8">
+            <a:extLst>
+              <a:ext uri="{FF2B5EF4-FFF2-40B4-BE49-F238E27FC236}">
+                <a16:creationId xmlns:a16="http://schemas.microsoft.com/office/drawing/2014/main" id="{0A6518E5-2017-1EE7-CEAC-01732709E8D8}"/>
+              </a:ext>
+            </a:extLst>
+          </p:cNvPr>
+          <p:cNvCxnSpPr>
+            <a:cxnSpLocks/>
+            <a:stCxn id="7" idx="2"/>
+            <a:endCxn id="6" idx="1"/>
+          </p:cNvCxnSpPr>
+          <p:nvPr/>
+        </p:nvCxnSpPr>
+        <p:spPr>
+          <a:xfrm>
+            <a:off x="1104900" y="1428750"/>
+            <a:ext cx="800100" cy="1579978"/>
+          </a:xfrm>
+          <a:prstGeom prst="straightConnector1">
+            <a:avLst/>
+          </a:prstGeom>
+          <a:ln w="82550">
+            <a:tailEnd type="triangle"/>
+          </a:ln>
+        </p:spPr>
+        <p:style>
+          <a:lnRef idx="1">
+            <a:schemeClr val="accent1"/>
+          </a:lnRef>
+          <a:fillRef idx="0">
+            <a:schemeClr val="accent1"/>
+          </a:fillRef>
+          <a:effectRef idx="0">
+            <a:schemeClr val="accent1"/>
+          </a:effectRef>
+          <a:fontRef idx="minor">
+            <a:schemeClr val="tx1"/>
+          </a:fontRef>
+        </p:style>
+      </p:cxnSp>
+      <p:cxnSp>
+        <p:nvCxnSpPr>
+          <p:cNvPr id="13" name="Straight Arrow Connector 12">
+            <a:extLst>
+              <a:ext uri="{FF2B5EF4-FFF2-40B4-BE49-F238E27FC236}">
+                <a16:creationId xmlns:a16="http://schemas.microsoft.com/office/drawing/2014/main" id="{AD7B72D6-1C20-E51F-E5D9-24B3C4C4871D}"/>
+              </a:ext>
+            </a:extLst>
+          </p:cNvPr>
+          <p:cNvCxnSpPr>
+            <a:cxnSpLocks/>
+            <a:stCxn id="6" idx="3"/>
+            <a:endCxn id="4" idx="1"/>
+          </p:cNvCxnSpPr>
+          <p:nvPr/>
+        </p:nvCxnSpPr>
+        <p:spPr>
+          <a:xfrm>
+            <a:off x="4114800" y="3008728"/>
+            <a:ext cx="3048000" cy="0"/>
+          </a:xfrm>
+          <a:prstGeom prst="straightConnector1">
+            <a:avLst/>
+          </a:prstGeom>
+          <a:ln w="82550">
+            <a:tailEnd type="triangle"/>
+          </a:ln>
+        </p:spPr>
+        <p:style>
+          <a:lnRef idx="1">
+            <a:schemeClr val="accent1"/>
+          </a:lnRef>
+          <a:fillRef idx="0">
+            <a:schemeClr val="accent1"/>
+          </a:fillRef>
+          <a:effectRef idx="0">
+            <a:schemeClr val="accent1"/>
+          </a:effectRef>
+          <a:fontRef idx="minor">
+            <a:schemeClr val="tx1"/>
+          </a:fontRef>
+        </p:style>
+      </p:cxnSp>
+      <p:cxnSp>
+        <p:nvCxnSpPr>
+          <p:cNvPr id="19" name="Straight Arrow Connector 18">
+            <a:extLst>
+              <a:ext uri="{FF2B5EF4-FFF2-40B4-BE49-F238E27FC236}">
+                <a16:creationId xmlns:a16="http://schemas.microsoft.com/office/drawing/2014/main" id="{93EB36F0-EA3C-2C98-CD8D-9B09BD3300D8}"/>
+              </a:ext>
+            </a:extLst>
+          </p:cNvPr>
+          <p:cNvCxnSpPr>
+            <a:cxnSpLocks/>
+            <a:stCxn id="5" idx="3"/>
+            <a:endCxn id="4" idx="0"/>
+          </p:cNvCxnSpPr>
+          <p:nvPr/>
+        </p:nvCxnSpPr>
+        <p:spPr>
+          <a:xfrm>
+            <a:off x="7010400" y="1504950"/>
+            <a:ext cx="1028700" cy="1046578"/>
+          </a:xfrm>
+          <a:prstGeom prst="straightConnector1">
+            <a:avLst/>
+          </a:prstGeom>
+          <a:ln w="82550">
+            <a:tailEnd type="triangle"/>
+          </a:ln>
+        </p:spPr>
+        <p:style>
+          <a:lnRef idx="1">
+            <a:schemeClr val="accent1"/>
+          </a:lnRef>
+          <a:fillRef idx="0">
+            <a:schemeClr val="accent1"/>
+          </a:fillRef>
+          <a:effectRef idx="0">
+            <a:schemeClr val="accent1"/>
+          </a:effectRef>
+          <a:fontRef idx="minor">
+            <a:schemeClr val="tx1"/>
+          </a:fontRef>
+        </p:style>
+      </p:cxnSp>
+      <p:cxnSp>
+        <p:nvCxnSpPr>
+          <p:cNvPr id="43" name="Straight Arrow Connector 42">
+            <a:extLst>
+              <a:ext uri="{FF2B5EF4-FFF2-40B4-BE49-F238E27FC236}">
+                <a16:creationId xmlns:a16="http://schemas.microsoft.com/office/drawing/2014/main" id="{CC1A1618-108C-9492-E385-C36F7A418B62}"/>
+              </a:ext>
+            </a:extLst>
+          </p:cNvPr>
+          <p:cNvCxnSpPr>
+            <a:cxnSpLocks/>
+            <a:stCxn id="6" idx="3"/>
+            <a:endCxn id="5" idx="1"/>
+          </p:cNvCxnSpPr>
+          <p:nvPr/>
+        </p:nvCxnSpPr>
+        <p:spPr>
+          <a:xfrm flipV="1">
+            <a:off x="4114800" y="1504950"/>
+            <a:ext cx="685800" cy="1503778"/>
+          </a:xfrm>
+          <a:prstGeom prst="straightConnector1">
+            <a:avLst/>
+          </a:prstGeom>
+          <a:ln w="82550">
+            <a:tailEnd type="triangle"/>
+          </a:ln>
+        </p:spPr>
+        <p:style>
+          <a:lnRef idx="1">
+            <a:schemeClr val="accent1"/>
+          </a:lnRef>
+          <a:fillRef idx="0">
+            <a:schemeClr val="accent1"/>
+          </a:fillRef>
+          <a:effectRef idx="0">
+            <a:schemeClr val="accent1"/>
+          </a:effectRef>
+          <a:fontRef idx="minor">
+            <a:schemeClr val="tx1"/>
+          </a:fontRef>
+        </p:style>
+      </p:cxnSp>
+    </p:spTree>
+    <p:extLst>
+      <p:ext uri="{BB962C8B-B14F-4D97-AF65-F5344CB8AC3E}">
+        <p14:creationId xmlns:p14="http://schemas.microsoft.com/office/powerpoint/2010/main" val="605507326"/>
       </p:ext>
     </p:extLst>
   </p:cSld>

</xml_diff>